<commit_message>
Ementa do curso e atualização de etapas
</commit_message>
<xml_diff>
--- a/apresentacoes/Aula-1/Etapa1-Apresentacao/Etapa1.pptx
+++ b/apresentacoes/Aula-1/Etapa1-Apresentacao/Etapa1.pptx
@@ -299,7 +299,7 @@
       </p15:sldGuideLst>
     </p:ext>
     <p:ext uri="http://customooxmlschemas.google.com/">
-      <go:slidesCustomData xmlns="" xmlns:mc="http://schemas.openxmlformats.org/markup-compatibility/2006" xmlns:mv="urn:schemas-microsoft-com:mac:vml" xmlns:c="http://schemas.openxmlformats.org/drawingml/2006/chart" xmlns:dgm="http://schemas.openxmlformats.org/drawingml/2006/diagram" xmlns:o="urn:schemas-microsoft-com:office:office" xmlns:v="urn:schemas-microsoft-com:vml" xmlns:pvml="urn:schemas-microsoft-com:office:powerpoint" xmlns:com="http://schemas.openxmlformats.org/drawingml/2006/compatibility" xmlns:p14="http://schemas.microsoft.com/office/powerpoint/2010/main" xmlns:p15="http://schemas.microsoft.com/office/powerpoint/2012/main" xmlns:ahyp="http://schemas.microsoft.com/office/drawing/2018/hyperlinkcolor" xmlns:go="http://customooxmlschemas.google.com/" r:id="rId35" roundtripDataSignature="AMtx7mij1fsZUe5V3lBG5qQcqOvrI5UhJw=="/>
+      <go:slidesCustomData xmlns:go="http://customooxmlschemas.google.com/" xmlns:ahyp="http://schemas.microsoft.com/office/drawing/2018/hyperlinkcolor" xmlns:p15="http://schemas.microsoft.com/office/powerpoint/2012/main" xmlns:p14="http://schemas.microsoft.com/office/powerpoint/2010/main" xmlns:com="http://schemas.openxmlformats.org/drawingml/2006/compatibility" xmlns:pvml="urn:schemas-microsoft-com:office:powerpoint" xmlns:v="urn:schemas-microsoft-com:vml" xmlns:o="urn:schemas-microsoft-com:office:office" xmlns:dgm="http://schemas.openxmlformats.org/drawingml/2006/diagram" xmlns:c="http://schemas.openxmlformats.org/drawingml/2006/chart" xmlns:mv="urn:schemas-microsoft-com:mac:vml" xmlns:mc="http://schemas.openxmlformats.org/markup-compatibility/2006" xmlns="" r:id="rId35" roundtripDataSignature="AMtx7mij1fsZUe5V3lBG5qQcqOvrI5UhJw=="/>
     </p:ext>
   </p:extLst>
 </p:presentation>
@@ -22434,7 +22434,7 @@
         <p:fade/>
       </p:transition>
     </mc:Choice>
-    <mc:Fallback xmlns="" xmlns:mv="urn:schemas-microsoft-com:mac:vml" xmlns:c="http://schemas.openxmlformats.org/drawingml/2006/chart" xmlns:dgm="http://schemas.openxmlformats.org/drawingml/2006/diagram" xmlns:o="urn:schemas-microsoft-com:office:office" xmlns:v="urn:schemas-microsoft-com:vml" xmlns:pvml="urn:schemas-microsoft-com:office:powerpoint" xmlns:com="http://schemas.openxmlformats.org/drawingml/2006/compatibility" xmlns:p15="http://schemas.microsoft.com/office/powerpoint/2012/main" xmlns:ahyp="http://schemas.microsoft.com/office/drawing/2018/hyperlinkcolor">
+    <mc:Fallback xmlns:ahyp="http://schemas.microsoft.com/office/drawing/2018/hyperlinkcolor" xmlns:p15="http://schemas.microsoft.com/office/powerpoint/2012/main" xmlns:com="http://schemas.openxmlformats.org/drawingml/2006/compatibility" xmlns:pvml="urn:schemas-microsoft-com:office:powerpoint" xmlns:v="urn:schemas-microsoft-com:vml" xmlns:o="urn:schemas-microsoft-com:office:office" xmlns:dgm="http://schemas.openxmlformats.org/drawingml/2006/diagram" xmlns:c="http://schemas.openxmlformats.org/drawingml/2006/chart" xmlns:mv="urn:schemas-microsoft-com:mac:vml" xmlns="">
       <p:transition spd="slow">
         <p:fade/>
       </p:transition>
@@ -22754,7 +22754,7 @@
         <p:fade/>
       </p:transition>
     </mc:Choice>
-    <mc:Fallback xmlns="" xmlns:mv="urn:schemas-microsoft-com:mac:vml" xmlns:c="http://schemas.openxmlformats.org/drawingml/2006/chart" xmlns:dgm="http://schemas.openxmlformats.org/drawingml/2006/diagram" xmlns:o="urn:schemas-microsoft-com:office:office" xmlns:v="urn:schemas-microsoft-com:vml" xmlns:pvml="urn:schemas-microsoft-com:office:powerpoint" xmlns:com="http://schemas.openxmlformats.org/drawingml/2006/compatibility" xmlns:p15="http://schemas.microsoft.com/office/powerpoint/2012/main" xmlns:ahyp="http://schemas.microsoft.com/office/drawing/2018/hyperlinkcolor">
+    <mc:Fallback xmlns:ahyp="http://schemas.microsoft.com/office/drawing/2018/hyperlinkcolor" xmlns:p15="http://schemas.microsoft.com/office/powerpoint/2012/main" xmlns:com="http://schemas.openxmlformats.org/drawingml/2006/compatibility" xmlns:pvml="urn:schemas-microsoft-com:office:powerpoint" xmlns:v="urn:schemas-microsoft-com:vml" xmlns:o="urn:schemas-microsoft-com:office:office" xmlns:dgm="http://schemas.openxmlformats.org/drawingml/2006/diagram" xmlns:c="http://schemas.openxmlformats.org/drawingml/2006/chart" xmlns:mv="urn:schemas-microsoft-com:mac:vml" xmlns="">
       <p:transition spd="slow">
         <p:fade/>
       </p:transition>
@@ -23162,7 +23162,7 @@
         <p:fade/>
       </p:transition>
     </mc:Choice>
-    <mc:Fallback xmlns="" xmlns:mv="urn:schemas-microsoft-com:mac:vml" xmlns:c="http://schemas.openxmlformats.org/drawingml/2006/chart" xmlns:dgm="http://schemas.openxmlformats.org/drawingml/2006/diagram" xmlns:o="urn:schemas-microsoft-com:office:office" xmlns:v="urn:schemas-microsoft-com:vml" xmlns:pvml="urn:schemas-microsoft-com:office:powerpoint" xmlns:com="http://schemas.openxmlformats.org/drawingml/2006/compatibility" xmlns:p15="http://schemas.microsoft.com/office/powerpoint/2012/main" xmlns:ahyp="http://schemas.microsoft.com/office/drawing/2018/hyperlinkcolor">
+    <mc:Fallback xmlns:ahyp="http://schemas.microsoft.com/office/drawing/2018/hyperlinkcolor" xmlns:p15="http://schemas.microsoft.com/office/powerpoint/2012/main" xmlns:com="http://schemas.openxmlformats.org/drawingml/2006/compatibility" xmlns:pvml="urn:schemas-microsoft-com:office:powerpoint" xmlns:v="urn:schemas-microsoft-com:vml" xmlns:o="urn:schemas-microsoft-com:office:office" xmlns:dgm="http://schemas.openxmlformats.org/drawingml/2006/diagram" xmlns:c="http://schemas.openxmlformats.org/drawingml/2006/chart" xmlns:mv="urn:schemas-microsoft-com:mac:vml" xmlns="">
       <p:transition spd="slow">
         <p:fade/>
       </p:transition>
@@ -23590,7 +23590,7 @@
         <p:fade/>
       </p:transition>
     </mc:Choice>
-    <mc:Fallback xmlns="" xmlns:mv="urn:schemas-microsoft-com:mac:vml" xmlns:c="http://schemas.openxmlformats.org/drawingml/2006/chart" xmlns:dgm="http://schemas.openxmlformats.org/drawingml/2006/diagram" xmlns:o="urn:schemas-microsoft-com:office:office" xmlns:v="urn:schemas-microsoft-com:vml" xmlns:pvml="urn:schemas-microsoft-com:office:powerpoint" xmlns:com="http://schemas.openxmlformats.org/drawingml/2006/compatibility" xmlns:p15="http://schemas.microsoft.com/office/powerpoint/2012/main" xmlns:ahyp="http://schemas.microsoft.com/office/drawing/2018/hyperlinkcolor">
+    <mc:Fallback xmlns:ahyp="http://schemas.microsoft.com/office/drawing/2018/hyperlinkcolor" xmlns:p15="http://schemas.microsoft.com/office/powerpoint/2012/main" xmlns:com="http://schemas.openxmlformats.org/drawingml/2006/compatibility" xmlns:pvml="urn:schemas-microsoft-com:office:powerpoint" xmlns:v="urn:schemas-microsoft-com:vml" xmlns:o="urn:schemas-microsoft-com:office:office" xmlns:dgm="http://schemas.openxmlformats.org/drawingml/2006/diagram" xmlns:c="http://schemas.openxmlformats.org/drawingml/2006/chart" xmlns:mv="urn:schemas-microsoft-com:mac:vml" xmlns="">
       <p:transition spd="slow">
         <p:fade/>
       </p:transition>
@@ -23965,7 +23965,7 @@
         <p:fade/>
       </p:transition>
     </mc:Choice>
-    <mc:Fallback xmlns="" xmlns:mv="urn:schemas-microsoft-com:mac:vml" xmlns:c="http://schemas.openxmlformats.org/drawingml/2006/chart" xmlns:dgm="http://schemas.openxmlformats.org/drawingml/2006/diagram" xmlns:o="urn:schemas-microsoft-com:office:office" xmlns:v="urn:schemas-microsoft-com:vml" xmlns:pvml="urn:schemas-microsoft-com:office:powerpoint" xmlns:com="http://schemas.openxmlformats.org/drawingml/2006/compatibility" xmlns:p15="http://schemas.microsoft.com/office/powerpoint/2012/main" xmlns:ahyp="http://schemas.microsoft.com/office/drawing/2018/hyperlinkcolor">
+    <mc:Fallback xmlns:ahyp="http://schemas.microsoft.com/office/drawing/2018/hyperlinkcolor" xmlns:p15="http://schemas.microsoft.com/office/powerpoint/2012/main" xmlns:com="http://schemas.openxmlformats.org/drawingml/2006/compatibility" xmlns:pvml="urn:schemas-microsoft-com:office:powerpoint" xmlns:v="urn:schemas-microsoft-com:vml" xmlns:o="urn:schemas-microsoft-com:office:office" xmlns:dgm="http://schemas.openxmlformats.org/drawingml/2006/diagram" xmlns:c="http://schemas.openxmlformats.org/drawingml/2006/chart" xmlns:mv="urn:schemas-microsoft-com:mac:vml" xmlns="">
       <p:transition spd="slow">
         <p:fade/>
       </p:transition>
@@ -24225,7 +24225,7 @@
         <p:spPr>
           <a:xfrm>
             <a:off x="142139" y="1637413"/>
-            <a:ext cx="9844362" cy="1938992"/>
+            <a:ext cx="9001861" cy="1938992"/>
           </a:xfrm>
           <a:prstGeom prst="rect">
             <a:avLst/>
@@ -24258,7 +24258,7 @@
                 <a:latin typeface="Calibri" panose="020F0502020204030204" pitchFamily="34" charset="0"/>
                 <a:cs typeface="Calibri" panose="020F0502020204030204" pitchFamily="34" charset="0"/>
               </a:rPr>
-              <a:t>        ◦ [ Etapa 1 ] - Explicação teórica do conceito de Listas Duplamente 			     Encadeadas</a:t>
+              <a:t>   ◦ [ Etapa 1 ] - Explicação teórica do conceito de Listas Duplamente 			     Encadeadas</a:t>
             </a:r>
           </a:p>
           <a:p>
@@ -24270,7 +24270,7 @@
                 <a:latin typeface="Calibri" panose="020F0502020204030204" pitchFamily="34" charset="0"/>
                 <a:cs typeface="Calibri" panose="020F0502020204030204" pitchFamily="34" charset="0"/>
               </a:rPr>
-              <a:t>        ◦ [ Etapa 2 ] - Implementação da classe </a:t>
+              <a:t>   ◦ [ Etapa 2 ] - Implementação da classe </a:t>
             </a:r>
             <a:r>
               <a:rPr lang="pt-BR" sz="2400" dirty="0" err="1">
@@ -24280,7 +24280,7 @@
                 <a:latin typeface="Calibri" panose="020F0502020204030204" pitchFamily="34" charset="0"/>
                 <a:cs typeface="Calibri" panose="020F0502020204030204" pitchFamily="34" charset="0"/>
               </a:rPr>
-              <a:t>ListaEncadeada</a:t>
+              <a:t>ListaDuplamenteEncadeada</a:t>
             </a:r>
             <a:r>
               <a:rPr lang="pt-BR" sz="2400" dirty="0">
@@ -24290,7 +24290,7 @@
                 <a:latin typeface="Calibri" panose="020F0502020204030204" pitchFamily="34" charset="0"/>
                 <a:cs typeface="Calibri" panose="020F0502020204030204" pitchFamily="34" charset="0"/>
               </a:rPr>
-              <a:t>()</a:t>
+              <a:t> ()</a:t>
             </a:r>
           </a:p>
           <a:p>
@@ -24302,7 +24302,7 @@
                 <a:latin typeface="Calibri" panose="020F0502020204030204" pitchFamily="34" charset="0"/>
                 <a:cs typeface="Calibri" panose="020F0502020204030204" pitchFamily="34" charset="0"/>
               </a:rPr>
-              <a:t>        ◦ [ Etapa 3 ] - Utilização da Classe </a:t>
+              <a:t>   ◦ [ Etapa 3 ] - Utilização da Classe </a:t>
             </a:r>
             <a:r>
               <a:rPr lang="pt-BR" sz="2400" dirty="0" err="1">
@@ -24312,7 +24312,7 @@
                 <a:latin typeface="Calibri" panose="020F0502020204030204" pitchFamily="34" charset="0"/>
                 <a:cs typeface="Calibri" panose="020F0502020204030204" pitchFamily="34" charset="0"/>
               </a:rPr>
-              <a:t>ListaEncadeada</a:t>
+              <a:t>ListaDuplamenteEncadeada</a:t>
             </a:r>
             <a:endParaRPr lang="pt-BR" sz="2400" dirty="0">
               <a:solidFill>
@@ -24340,7 +24340,7 @@
         <p:fade/>
       </p:transition>
     </mc:Choice>
-    <mc:Fallback xmlns="" xmlns:mv="urn:schemas-microsoft-com:mac:vml" xmlns:c="http://schemas.openxmlformats.org/drawingml/2006/chart" xmlns:dgm="http://schemas.openxmlformats.org/drawingml/2006/diagram" xmlns:o="urn:schemas-microsoft-com:office:office" xmlns:v="urn:schemas-microsoft-com:vml" xmlns:pvml="urn:schemas-microsoft-com:office:powerpoint" xmlns:com="http://schemas.openxmlformats.org/drawingml/2006/compatibility" xmlns:p15="http://schemas.microsoft.com/office/powerpoint/2012/main" xmlns:ahyp="http://schemas.microsoft.com/office/drawing/2018/hyperlinkcolor">
+    <mc:Fallback xmlns:ahyp="http://schemas.microsoft.com/office/drawing/2018/hyperlinkcolor" xmlns:p15="http://schemas.microsoft.com/office/powerpoint/2012/main" xmlns:com="http://schemas.openxmlformats.org/drawingml/2006/compatibility" xmlns:pvml="urn:schemas-microsoft-com:office:powerpoint" xmlns:v="urn:schemas-microsoft-com:vml" xmlns:o="urn:schemas-microsoft-com:office:office" xmlns:dgm="http://schemas.openxmlformats.org/drawingml/2006/diagram" xmlns:c="http://schemas.openxmlformats.org/drawingml/2006/chart" xmlns:mv="urn:schemas-microsoft-com:mac:vml" xmlns="">
       <p:transition spd="slow">
         <p:fade/>
       </p:transition>
@@ -24715,7 +24715,7 @@
         <p:fade/>
       </p:transition>
     </mc:Choice>
-    <mc:Fallback xmlns="" xmlns:mv="urn:schemas-microsoft-com:mac:vml" xmlns:c="http://schemas.openxmlformats.org/drawingml/2006/chart" xmlns:dgm="http://schemas.openxmlformats.org/drawingml/2006/diagram" xmlns:o="urn:schemas-microsoft-com:office:office" xmlns:v="urn:schemas-microsoft-com:vml" xmlns:pvml="urn:schemas-microsoft-com:office:powerpoint" xmlns:com="http://schemas.openxmlformats.org/drawingml/2006/compatibility" xmlns:p15="http://schemas.microsoft.com/office/powerpoint/2012/main" xmlns:ahyp="http://schemas.microsoft.com/office/drawing/2018/hyperlinkcolor">
+    <mc:Fallback xmlns:ahyp="http://schemas.microsoft.com/office/drawing/2018/hyperlinkcolor" xmlns:p15="http://schemas.microsoft.com/office/powerpoint/2012/main" xmlns:com="http://schemas.openxmlformats.org/drawingml/2006/compatibility" xmlns:pvml="urn:schemas-microsoft-com:office:powerpoint" xmlns:v="urn:schemas-microsoft-com:vml" xmlns:o="urn:schemas-microsoft-com:office:office" xmlns:dgm="http://schemas.openxmlformats.org/drawingml/2006/diagram" xmlns:c="http://schemas.openxmlformats.org/drawingml/2006/chart" xmlns:mv="urn:schemas-microsoft-com:mac:vml" xmlns="">
       <p:transition spd="slow">
         <p:fade/>
       </p:transition>
@@ -25173,7 +25173,7 @@
         <p:fade/>
       </p:transition>
     </mc:Choice>
-    <mc:Fallback xmlns="" xmlns:mv="urn:schemas-microsoft-com:mac:vml" xmlns:c="http://schemas.openxmlformats.org/drawingml/2006/chart" xmlns:dgm="http://schemas.openxmlformats.org/drawingml/2006/diagram" xmlns:o="urn:schemas-microsoft-com:office:office" xmlns:v="urn:schemas-microsoft-com:vml" xmlns:pvml="urn:schemas-microsoft-com:office:powerpoint" xmlns:com="http://schemas.openxmlformats.org/drawingml/2006/compatibility" xmlns:p15="http://schemas.microsoft.com/office/powerpoint/2012/main" xmlns:ahyp="http://schemas.microsoft.com/office/drawing/2018/hyperlinkcolor">
+    <mc:Fallback xmlns:ahyp="http://schemas.microsoft.com/office/drawing/2018/hyperlinkcolor" xmlns:p15="http://schemas.microsoft.com/office/powerpoint/2012/main" xmlns:com="http://schemas.openxmlformats.org/drawingml/2006/compatibility" xmlns:pvml="urn:schemas-microsoft-com:office:powerpoint" xmlns:v="urn:schemas-microsoft-com:vml" xmlns:o="urn:schemas-microsoft-com:office:office" xmlns:dgm="http://schemas.openxmlformats.org/drawingml/2006/diagram" xmlns:c="http://schemas.openxmlformats.org/drawingml/2006/chart" xmlns:mv="urn:schemas-microsoft-com:mac:vml" xmlns="">
       <p:transition spd="slow">
         <p:fade/>
       </p:transition>
@@ -25433,7 +25433,7 @@
         <p:spPr>
           <a:xfrm>
             <a:off x="99606" y="1279198"/>
-            <a:ext cx="8906168" cy="2677656"/>
+            <a:ext cx="8906168" cy="3046988"/>
           </a:xfrm>
           <a:prstGeom prst="rect">
             <a:avLst/>
@@ -25466,7 +25466,56 @@
                 <a:latin typeface="Calibri" panose="020F0502020204030204" pitchFamily="34" charset="0"/>
                 <a:cs typeface="Calibri" panose="020F0502020204030204" pitchFamily="34" charset="0"/>
               </a:rPr>
-              <a:t>        ◦ [ Etapa 1 ] - </a:t>
+              <a:t>        ◦ [ Etapa 1 ] - Conceitos de </a:t>
+            </a:r>
+            <a:r>
+              <a:rPr lang="pt-BR" sz="2400" dirty="0" err="1">
+                <a:solidFill>
+                  <a:srgbClr val="002060"/>
+                </a:solidFill>
+                <a:latin typeface="Calibri" panose="020F0502020204030204" pitchFamily="34" charset="0"/>
+                <a:cs typeface="Calibri" panose="020F0502020204030204" pitchFamily="34" charset="0"/>
+              </a:rPr>
+              <a:t>equals</a:t>
+            </a:r>
+            <a:r>
+              <a:rPr lang="pt-BR" sz="2400" dirty="0">
+                <a:solidFill>
+                  <a:srgbClr val="002060"/>
+                </a:solidFill>
+                <a:latin typeface="Calibri" panose="020F0502020204030204" pitchFamily="34" charset="0"/>
+                <a:cs typeface="Calibri" panose="020F0502020204030204" pitchFamily="34" charset="0"/>
+              </a:rPr>
+              <a:t> e </a:t>
+            </a:r>
+            <a:r>
+              <a:rPr lang="pt-BR" sz="2400" dirty="0" err="1">
+                <a:solidFill>
+                  <a:srgbClr val="002060"/>
+                </a:solidFill>
+                <a:latin typeface="Calibri" panose="020F0502020204030204" pitchFamily="34" charset="0"/>
+                <a:cs typeface="Calibri" panose="020F0502020204030204" pitchFamily="34" charset="0"/>
+              </a:rPr>
+              <a:t>hashCode</a:t>
+            </a:r>
+            <a:endParaRPr lang="pt-BR" sz="2400" dirty="0">
+              <a:solidFill>
+                <a:srgbClr val="002060"/>
+              </a:solidFill>
+              <a:latin typeface="Calibri" panose="020F0502020204030204" pitchFamily="34" charset="0"/>
+              <a:cs typeface="Calibri" panose="020F0502020204030204" pitchFamily="34" charset="0"/>
+            </a:endParaRPr>
+          </a:p>
+          <a:p>
+            <a:r>
+              <a:rPr lang="pt-BR" sz="2400" dirty="0">
+                <a:solidFill>
+                  <a:srgbClr val="002060"/>
+                </a:solidFill>
+                <a:latin typeface="Calibri" panose="020F0502020204030204" pitchFamily="34" charset="0"/>
+                <a:cs typeface="Calibri" panose="020F0502020204030204" pitchFamily="34" charset="0"/>
+              </a:rPr>
+              <a:t>        ◦ [ Etapa 2 ] - </a:t>
             </a:r>
             <a:r>
               <a:rPr lang="pt-BR" sz="2400" dirty="0" err="1">
@@ -25498,7 +25547,7 @@
                 <a:latin typeface="Calibri" panose="020F0502020204030204" pitchFamily="34" charset="0"/>
                 <a:cs typeface="Calibri" panose="020F0502020204030204" pitchFamily="34" charset="0"/>
               </a:rPr>
-              <a:t>        ◦ [ Etapa 2 ] - </a:t>
+              <a:t>        ◦ [ Etapa 3 ] - </a:t>
             </a:r>
             <a:r>
               <a:rPr lang="pt-BR" sz="2400" dirty="0" err="1">
@@ -25530,7 +25579,27 @@
                 <a:latin typeface="Calibri" panose="020F0502020204030204" pitchFamily="34" charset="0"/>
                 <a:cs typeface="Calibri" panose="020F0502020204030204" pitchFamily="34" charset="0"/>
               </a:rPr>
-              <a:t>        ◦ [ Etapa 3 ] - </a:t>
+              <a:t>        ◦ [ Etapa 4 ] - </a:t>
+            </a:r>
+            <a:r>
+              <a:rPr lang="pt-BR" sz="2400" dirty="0" err="1">
+                <a:solidFill>
+                  <a:srgbClr val="002060"/>
+                </a:solidFill>
+                <a:latin typeface="Calibri" panose="020F0502020204030204" pitchFamily="34" charset="0"/>
+                <a:cs typeface="Calibri" panose="020F0502020204030204" pitchFamily="34" charset="0"/>
+              </a:rPr>
+              <a:t>List</a:t>
+            </a:r>
+            <a:r>
+              <a:rPr lang="pt-BR" sz="2400" dirty="0">
+                <a:solidFill>
+                  <a:srgbClr val="002060"/>
+                </a:solidFill>
+                <a:latin typeface="Calibri" panose="020F0502020204030204" pitchFamily="34" charset="0"/>
+                <a:cs typeface="Calibri" panose="020F0502020204030204" pitchFamily="34" charset="0"/>
+              </a:rPr>
+              <a:t> (</a:t>
             </a:r>
             <a:r>
               <a:rPr lang="pt-BR" sz="2400" dirty="0" err="1">
@@ -25550,7 +25619,27 @@
                 <a:latin typeface="Calibri" panose="020F0502020204030204" pitchFamily="34" charset="0"/>
                 <a:cs typeface="Calibri" panose="020F0502020204030204" pitchFamily="34" charset="0"/>
               </a:rPr>
-              <a:t> (Listas)</a:t>
+              <a:t>, </a:t>
+            </a:r>
+            <a:r>
+              <a:rPr lang="pt-BR" sz="2400" dirty="0" err="1">
+                <a:solidFill>
+                  <a:srgbClr val="002060"/>
+                </a:solidFill>
+                <a:latin typeface="Calibri" panose="020F0502020204030204" pitchFamily="34" charset="0"/>
+                <a:cs typeface="Calibri" panose="020F0502020204030204" pitchFamily="34" charset="0"/>
+              </a:rPr>
+              <a:t>LikedList</a:t>
+            </a:r>
+            <a:r>
+              <a:rPr lang="pt-BR" sz="2400" dirty="0">
+                <a:solidFill>
+                  <a:srgbClr val="002060"/>
+                </a:solidFill>
+                <a:latin typeface="Calibri" panose="020F0502020204030204" pitchFamily="34" charset="0"/>
+                <a:cs typeface="Calibri" panose="020F0502020204030204" pitchFamily="34" charset="0"/>
+              </a:rPr>
+              <a:t>, Vector)</a:t>
             </a:r>
           </a:p>
           <a:p>
@@ -25562,7 +25651,7 @@
                 <a:latin typeface="Calibri" panose="020F0502020204030204" pitchFamily="34" charset="0"/>
                 <a:cs typeface="Calibri" panose="020F0502020204030204" pitchFamily="34" charset="0"/>
               </a:rPr>
-              <a:t>        ◦ [ Etapa 4 ] - </a:t>
+              <a:t>        ◦ [ Etapa 5 ] - </a:t>
             </a:r>
             <a:r>
               <a:rPr lang="pt-BR" sz="2400" dirty="0" err="1">
@@ -25591,7 +25680,7 @@
                 <a:latin typeface="Calibri" panose="020F0502020204030204" pitchFamily="34" charset="0"/>
                 <a:cs typeface="Calibri" panose="020F0502020204030204" pitchFamily="34" charset="0"/>
               </a:rPr>
-              <a:t>        ◦ [ Etapa 5 ] - </a:t>
+              <a:t>        ◦ [ Etapa 6 ] - </a:t>
             </a:r>
             <a:r>
               <a:rPr lang="pt-BR" sz="2400" dirty="0" err="1">
@@ -25623,7 +25712,7 @@
                 <a:latin typeface="Calibri" panose="020F0502020204030204" pitchFamily="34" charset="0"/>
                 <a:cs typeface="Calibri" panose="020F0502020204030204" pitchFamily="34" charset="0"/>
               </a:rPr>
-              <a:t>        ◦ [ Etapa 6 ] - Conclusão</a:t>
+              <a:t>        ◦ [ Etapa 7 ] - Conclusão</a:t>
             </a:r>
           </a:p>
         </p:txBody>
@@ -25644,7 +25733,7 @@
         <p:fade/>
       </p:transition>
     </mc:Choice>
-    <mc:Fallback xmlns="" xmlns:mv="urn:schemas-microsoft-com:mac:vml" xmlns:c="http://schemas.openxmlformats.org/drawingml/2006/chart" xmlns:dgm="http://schemas.openxmlformats.org/drawingml/2006/diagram" xmlns:o="urn:schemas-microsoft-com:office:office" xmlns:v="urn:schemas-microsoft-com:vml" xmlns:pvml="urn:schemas-microsoft-com:office:powerpoint" xmlns:com="http://schemas.openxmlformats.org/drawingml/2006/compatibility" xmlns:p15="http://schemas.microsoft.com/office/powerpoint/2012/main" xmlns:ahyp="http://schemas.microsoft.com/office/drawing/2018/hyperlinkcolor">
+    <mc:Fallback xmlns:ahyp="http://schemas.microsoft.com/office/drawing/2018/hyperlinkcolor" xmlns:p15="http://schemas.microsoft.com/office/powerpoint/2012/main" xmlns:com="http://schemas.openxmlformats.org/drawingml/2006/compatibility" xmlns:pvml="urn:schemas-microsoft-com:office:powerpoint" xmlns:v="urn:schemas-microsoft-com:vml" xmlns:o="urn:schemas-microsoft-com:office:office" xmlns:dgm="http://schemas.openxmlformats.org/drawingml/2006/diagram" xmlns:c="http://schemas.openxmlformats.org/drawingml/2006/chart" xmlns:mv="urn:schemas-microsoft-com:mac:vml" xmlns="">
       <p:transition spd="slow">
         <p:fade/>
       </p:transition>
@@ -26446,7 +26535,7 @@
         <p:fade/>
       </p:transition>
     </mc:Choice>
-    <mc:Fallback xmlns="" xmlns:mv="urn:schemas-microsoft-com:mac:vml" xmlns:c="http://schemas.openxmlformats.org/drawingml/2006/chart" xmlns:dgm="http://schemas.openxmlformats.org/drawingml/2006/diagram" xmlns:o="urn:schemas-microsoft-com:office:office" xmlns:v="urn:schemas-microsoft-com:vml" xmlns:pvml="urn:schemas-microsoft-com:office:powerpoint" xmlns:com="http://schemas.openxmlformats.org/drawingml/2006/compatibility" xmlns:p15="http://schemas.microsoft.com/office/powerpoint/2012/main" xmlns:ahyp="http://schemas.microsoft.com/office/drawing/2018/hyperlinkcolor">
+    <mc:Fallback xmlns:ahyp="http://schemas.microsoft.com/office/drawing/2018/hyperlinkcolor" xmlns:p15="http://schemas.microsoft.com/office/powerpoint/2012/main" xmlns:com="http://schemas.openxmlformats.org/drawingml/2006/compatibility" xmlns:pvml="urn:schemas-microsoft-com:office:powerpoint" xmlns:v="urn:schemas-microsoft-com:vml" xmlns:o="urn:schemas-microsoft-com:office:office" xmlns:dgm="http://schemas.openxmlformats.org/drawingml/2006/diagram" xmlns:c="http://schemas.openxmlformats.org/drawingml/2006/chart" xmlns:mv="urn:schemas-microsoft-com:mac:vml" xmlns="">
       <p:transition spd="slow">
         <p:fade/>
       </p:transition>
@@ -27251,7 +27340,7 @@
         <p:fade/>
       </p:transition>
     </mc:Choice>
-    <mc:Fallback xmlns="" xmlns:mv="urn:schemas-microsoft-com:mac:vml" xmlns:c="http://schemas.openxmlformats.org/drawingml/2006/chart" xmlns:dgm="http://schemas.openxmlformats.org/drawingml/2006/diagram" xmlns:o="urn:schemas-microsoft-com:office:office" xmlns:v="urn:schemas-microsoft-com:vml" xmlns:pvml="urn:schemas-microsoft-com:office:powerpoint" xmlns:com="http://schemas.openxmlformats.org/drawingml/2006/compatibility" xmlns:p15="http://schemas.microsoft.com/office/powerpoint/2012/main" xmlns:ahyp="http://schemas.microsoft.com/office/drawing/2018/hyperlinkcolor">
+    <mc:Fallback xmlns:ahyp="http://schemas.microsoft.com/office/drawing/2018/hyperlinkcolor" xmlns:p15="http://schemas.microsoft.com/office/powerpoint/2012/main" xmlns:com="http://schemas.openxmlformats.org/drawingml/2006/compatibility" xmlns:pvml="urn:schemas-microsoft-com:office:powerpoint" xmlns:v="urn:schemas-microsoft-com:vml" xmlns:o="urn:schemas-microsoft-com:office:office" xmlns:dgm="http://schemas.openxmlformats.org/drawingml/2006/diagram" xmlns:c="http://schemas.openxmlformats.org/drawingml/2006/chart" xmlns:mv="urn:schemas-microsoft-com:mac:vml" xmlns="">
       <p:transition spd="slow">
         <p:fade/>
       </p:transition>
@@ -27590,7 +27679,7 @@
         <p:fade/>
       </p:transition>
     </mc:Choice>
-    <mc:Fallback xmlns="" xmlns:mv="urn:schemas-microsoft-com:mac:vml" xmlns:c="http://schemas.openxmlformats.org/drawingml/2006/chart" xmlns:dgm="http://schemas.openxmlformats.org/drawingml/2006/diagram" xmlns:o="urn:schemas-microsoft-com:office:office" xmlns:v="urn:schemas-microsoft-com:vml" xmlns:pvml="urn:schemas-microsoft-com:office:powerpoint" xmlns:com="http://schemas.openxmlformats.org/drawingml/2006/compatibility" xmlns:p15="http://schemas.microsoft.com/office/powerpoint/2012/main" xmlns:ahyp="http://schemas.microsoft.com/office/drawing/2018/hyperlinkcolor">
+    <mc:Fallback xmlns:ahyp="http://schemas.microsoft.com/office/drawing/2018/hyperlinkcolor" xmlns:p15="http://schemas.microsoft.com/office/powerpoint/2012/main" xmlns:com="http://schemas.openxmlformats.org/drawingml/2006/compatibility" xmlns:pvml="urn:schemas-microsoft-com:office:powerpoint" xmlns:v="urn:schemas-microsoft-com:vml" xmlns:o="urn:schemas-microsoft-com:office:office" xmlns:dgm="http://schemas.openxmlformats.org/drawingml/2006/diagram" xmlns:c="http://schemas.openxmlformats.org/drawingml/2006/chart" xmlns:mv="urn:schemas-microsoft-com:mac:vml" xmlns="">
       <p:transition spd="slow">
         <p:fade/>
       </p:transition>
@@ -27916,7 +28005,7 @@
         <p:fade/>
       </p:transition>
     </mc:Choice>
-    <mc:Fallback xmlns="" xmlns:mv="urn:schemas-microsoft-com:mac:vml" xmlns:c="http://schemas.openxmlformats.org/drawingml/2006/chart" xmlns:dgm="http://schemas.openxmlformats.org/drawingml/2006/diagram" xmlns:o="urn:schemas-microsoft-com:office:office" xmlns:v="urn:schemas-microsoft-com:vml" xmlns:pvml="urn:schemas-microsoft-com:office:powerpoint" xmlns:com="http://schemas.openxmlformats.org/drawingml/2006/compatibility" xmlns:p15="http://schemas.microsoft.com/office/powerpoint/2012/main" xmlns:ahyp="http://schemas.microsoft.com/office/drawing/2018/hyperlinkcolor">
+    <mc:Fallback xmlns:ahyp="http://schemas.microsoft.com/office/drawing/2018/hyperlinkcolor" xmlns:p15="http://schemas.microsoft.com/office/powerpoint/2012/main" xmlns:com="http://schemas.openxmlformats.org/drawingml/2006/compatibility" xmlns:pvml="urn:schemas-microsoft-com:office:powerpoint" xmlns:v="urn:schemas-microsoft-com:vml" xmlns:o="urn:schemas-microsoft-com:office:office" xmlns:dgm="http://schemas.openxmlformats.org/drawingml/2006/diagram" xmlns:c="http://schemas.openxmlformats.org/drawingml/2006/chart" xmlns:mv="urn:schemas-microsoft-com:mac:vml" xmlns="">
       <p:transition spd="slow">
         <p:fade/>
       </p:transition>
@@ -28251,7 +28340,7 @@
         <p:fade/>
       </p:transition>
     </mc:Choice>
-    <mc:Fallback xmlns="" xmlns:mv="urn:schemas-microsoft-com:mac:vml" xmlns:c="http://schemas.openxmlformats.org/drawingml/2006/chart" xmlns:dgm="http://schemas.openxmlformats.org/drawingml/2006/diagram" xmlns:o="urn:schemas-microsoft-com:office:office" xmlns:v="urn:schemas-microsoft-com:vml" xmlns:pvml="urn:schemas-microsoft-com:office:powerpoint" xmlns:com="http://schemas.openxmlformats.org/drawingml/2006/compatibility" xmlns:p15="http://schemas.microsoft.com/office/powerpoint/2012/main" xmlns:ahyp="http://schemas.microsoft.com/office/drawing/2018/hyperlinkcolor">
+    <mc:Fallback xmlns:ahyp="http://schemas.microsoft.com/office/drawing/2018/hyperlinkcolor" xmlns:p15="http://schemas.microsoft.com/office/powerpoint/2012/main" xmlns:com="http://schemas.openxmlformats.org/drawingml/2006/compatibility" xmlns:pvml="urn:schemas-microsoft-com:office:powerpoint" xmlns:v="urn:schemas-microsoft-com:vml" xmlns:o="urn:schemas-microsoft-com:office:office" xmlns:dgm="http://schemas.openxmlformats.org/drawingml/2006/diagram" xmlns:c="http://schemas.openxmlformats.org/drawingml/2006/chart" xmlns:mv="urn:schemas-microsoft-com:mac:vml" xmlns="">
       <p:transition spd="slow">
         <p:fade/>
       </p:transition>
@@ -28537,7 +28626,7 @@
         <p:fade/>
       </p:transition>
     </mc:Choice>
-    <mc:Fallback xmlns="" xmlns:mv="urn:schemas-microsoft-com:mac:vml" xmlns:c="http://schemas.openxmlformats.org/drawingml/2006/chart" xmlns:dgm="http://schemas.openxmlformats.org/drawingml/2006/diagram" xmlns:o="urn:schemas-microsoft-com:office:office" xmlns:v="urn:schemas-microsoft-com:vml" xmlns:pvml="urn:schemas-microsoft-com:office:powerpoint" xmlns:com="http://schemas.openxmlformats.org/drawingml/2006/compatibility" xmlns:p15="http://schemas.microsoft.com/office/powerpoint/2012/main" xmlns:ahyp="http://schemas.microsoft.com/office/drawing/2018/hyperlinkcolor">
+    <mc:Fallback xmlns:ahyp="http://schemas.microsoft.com/office/drawing/2018/hyperlinkcolor" xmlns:p15="http://schemas.microsoft.com/office/powerpoint/2012/main" xmlns:com="http://schemas.openxmlformats.org/drawingml/2006/compatibility" xmlns:pvml="urn:schemas-microsoft-com:office:powerpoint" xmlns:v="urn:schemas-microsoft-com:vml" xmlns:o="urn:schemas-microsoft-com:office:office" xmlns:dgm="http://schemas.openxmlformats.org/drawingml/2006/diagram" xmlns:c="http://schemas.openxmlformats.org/drawingml/2006/chart" xmlns:mv="urn:schemas-microsoft-com:mac:vml" xmlns="">
       <p:transition spd="slow">
         <p:fade/>
       </p:transition>
@@ -28990,7 +29079,7 @@
         <p:fade/>
       </p:transition>
     </mc:Choice>
-    <mc:Fallback xmlns="" xmlns:mv="urn:schemas-microsoft-com:mac:vml" xmlns:c="http://schemas.openxmlformats.org/drawingml/2006/chart" xmlns:dgm="http://schemas.openxmlformats.org/drawingml/2006/diagram" xmlns:o="urn:schemas-microsoft-com:office:office" xmlns:v="urn:schemas-microsoft-com:vml" xmlns:pvml="urn:schemas-microsoft-com:office:powerpoint" xmlns:com="http://schemas.openxmlformats.org/drawingml/2006/compatibility" xmlns:p15="http://schemas.microsoft.com/office/powerpoint/2012/main" xmlns:ahyp="http://schemas.microsoft.com/office/drawing/2018/hyperlinkcolor">
+    <mc:Fallback xmlns:ahyp="http://schemas.microsoft.com/office/drawing/2018/hyperlinkcolor" xmlns:p15="http://schemas.microsoft.com/office/powerpoint/2012/main" xmlns:com="http://schemas.openxmlformats.org/drawingml/2006/compatibility" xmlns:pvml="urn:schemas-microsoft-com:office:powerpoint" xmlns:v="urn:schemas-microsoft-com:vml" xmlns:o="urn:schemas-microsoft-com:office:office" xmlns:dgm="http://schemas.openxmlformats.org/drawingml/2006/diagram" xmlns:c="http://schemas.openxmlformats.org/drawingml/2006/chart" xmlns:mv="urn:schemas-microsoft-com:mac:vml" xmlns="">
       <p:transition spd="slow">
         <p:fade/>
       </p:transition>
@@ -29276,7 +29365,7 @@
         <p:fade/>
       </p:transition>
     </mc:Choice>
-    <mc:Fallback xmlns="" xmlns:mv="urn:schemas-microsoft-com:mac:vml" xmlns:c="http://schemas.openxmlformats.org/drawingml/2006/chart" xmlns:dgm="http://schemas.openxmlformats.org/drawingml/2006/diagram" xmlns:o="urn:schemas-microsoft-com:office:office" xmlns:v="urn:schemas-microsoft-com:vml" xmlns:pvml="urn:schemas-microsoft-com:office:powerpoint" xmlns:com="http://schemas.openxmlformats.org/drawingml/2006/compatibility" xmlns:p15="http://schemas.microsoft.com/office/powerpoint/2012/main" xmlns:ahyp="http://schemas.microsoft.com/office/drawing/2018/hyperlinkcolor">
+    <mc:Fallback xmlns:ahyp="http://schemas.microsoft.com/office/drawing/2018/hyperlinkcolor" xmlns:p15="http://schemas.microsoft.com/office/powerpoint/2012/main" xmlns:com="http://schemas.openxmlformats.org/drawingml/2006/compatibility" xmlns:pvml="urn:schemas-microsoft-com:office:powerpoint" xmlns:v="urn:schemas-microsoft-com:vml" xmlns:o="urn:schemas-microsoft-com:office:office" xmlns:dgm="http://schemas.openxmlformats.org/drawingml/2006/diagram" xmlns:c="http://schemas.openxmlformats.org/drawingml/2006/chart" xmlns:mv="urn:schemas-microsoft-com:mac:vml" xmlns="">
       <p:transition spd="slow">
         <p:fade/>
       </p:transition>
@@ -29608,7 +29697,7 @@
         <p:fade/>
       </p:transition>
     </mc:Choice>
-    <mc:Fallback xmlns="" xmlns:mv="urn:schemas-microsoft-com:mac:vml" xmlns:c="http://schemas.openxmlformats.org/drawingml/2006/chart" xmlns:dgm="http://schemas.openxmlformats.org/drawingml/2006/diagram" xmlns:o="urn:schemas-microsoft-com:office:office" xmlns:v="urn:schemas-microsoft-com:vml" xmlns:pvml="urn:schemas-microsoft-com:office:powerpoint" xmlns:com="http://schemas.openxmlformats.org/drawingml/2006/compatibility" xmlns:p15="http://schemas.microsoft.com/office/powerpoint/2012/main" xmlns:ahyp="http://schemas.microsoft.com/office/drawing/2018/hyperlinkcolor">
+    <mc:Fallback xmlns:ahyp="http://schemas.microsoft.com/office/drawing/2018/hyperlinkcolor" xmlns:p15="http://schemas.microsoft.com/office/powerpoint/2012/main" xmlns:com="http://schemas.openxmlformats.org/drawingml/2006/compatibility" xmlns:pvml="urn:schemas-microsoft-com:office:powerpoint" xmlns:v="urn:schemas-microsoft-com:vml" xmlns:o="urn:schemas-microsoft-com:office:office" xmlns:dgm="http://schemas.openxmlformats.org/drawingml/2006/diagram" xmlns:c="http://schemas.openxmlformats.org/drawingml/2006/chart" xmlns:mv="urn:schemas-microsoft-com:mac:vml" xmlns="">
       <p:transition spd="slow">
         <p:fade/>
       </p:transition>

</xml_diff>